<commit_message>
Anpassung der Titelfolie der ersten Praesentation des Urban Explorer
</commit_message>
<xml_diff>
--- a/05)Praesentationen/PräsiThema.pptx
+++ b/05)Praesentationen/PräsiThema.pptx
@@ -107,6 +107,11 @@
       </a:defRPr>
     </a:lvl9pPr>
   </p:defaultTextStyle>
+  <p:extLst>
+    <p:ext uri="{EFAFB233-063F-42B5-8137-9DF3F51BA10A}">
+      <p15:sldGuideLst xmlns:p15="http://schemas.microsoft.com/office/powerpoint/2012/main"/>
+    </p:ext>
+  </p:extLst>
 </p:presentation>
 </file>
 
@@ -184,7 +189,7 @@
           </a:lstStyle>
           <a:p>
             <a:r>
-              <a:rPr lang="de-DE" smtClean="0"/>
+              <a:rPr lang="de-DE"/>
               <a:t>Titelmasterformat durch Klicken bearbeiten</a:t>
             </a:r>
             <a:endParaRPr lang="en-US" dirty="0"/>
@@ -257,7 +262,7 @@
           </a:lstStyle>
           <a:p>
             <a:r>
-              <a:rPr lang="de-DE" smtClean="0"/>
+              <a:rPr lang="de-DE"/>
               <a:t>Formatvorlage des Untertitelmasters durch Klicken bearbeiten</a:t>
             </a:r>
             <a:endParaRPr lang="en-US" dirty="0"/>
@@ -281,7 +286,7 @@
           <a:p>
             <a:fld id="{48A87A34-81AB-432B-8DAE-1953F412C126}" type="datetimeFigureOut">
               <a:rPr lang="en-US" dirty="0"/>
-              <a:t>2/4/2019</a:t>
+              <a:t>2/9/2019</a:t>
             </a:fld>
             <a:endParaRPr lang="en-US" dirty="0"/>
           </a:p>
@@ -409,7 +414,7 @@
           </a:lstStyle>
           <a:p>
             <a:r>
-              <a:rPr lang="de-DE" smtClean="0"/>
+              <a:rPr lang="de-DE"/>
               <a:t>Titelmasterformat durch Klicken bearbeiten</a:t>
             </a:r>
             <a:endParaRPr lang="en-US" dirty="0"/>
@@ -499,7 +504,7 @@
           </a:lstStyle>
           <a:p>
             <a:r>
-              <a:rPr lang="de-DE" smtClean="0"/>
+              <a:rPr lang="de-DE"/>
               <a:t>Bild durch Klicken auf Symbol hinzufügen</a:t>
             </a:r>
             <a:endParaRPr lang="en-US" dirty="0"/>
@@ -565,7 +570,7 @@
           <a:p>
             <a:pPr lvl="0"/>
             <a:r>
-              <a:rPr lang="de-DE" smtClean="0"/>
+              <a:rPr lang="de-DE"/>
               <a:t>Formatvorlagen des Textmasters bearbeiten</a:t>
             </a:r>
           </a:p>
@@ -588,7 +593,7 @@
           <a:p>
             <a:fld id="{48A87A34-81AB-432B-8DAE-1953F412C126}" type="datetimeFigureOut">
               <a:rPr lang="en-US" dirty="0"/>
-              <a:t>2/4/2019</a:t>
+              <a:t>2/9/2019</a:t>
             </a:fld>
             <a:endParaRPr lang="en-US" dirty="0"/>
           </a:p>
@@ -716,7 +721,7 @@
           </a:lstStyle>
           <a:p>
             <a:r>
-              <a:rPr lang="de-DE" smtClean="0"/>
+              <a:rPr lang="de-DE"/>
               <a:t>Titelmasterformat durch Klicken bearbeiten</a:t>
             </a:r>
             <a:endParaRPr lang="en-US" dirty="0"/>
@@ -782,7 +787,7 @@
           <a:p>
             <a:pPr lvl="0"/>
             <a:r>
-              <a:rPr lang="de-DE" smtClean="0"/>
+              <a:rPr lang="de-DE"/>
               <a:t>Formatvorlagen des Textmasters bearbeiten</a:t>
             </a:r>
           </a:p>
@@ -805,7 +810,7 @@
           <a:p>
             <a:fld id="{48A87A34-81AB-432B-8DAE-1953F412C126}" type="datetimeFigureOut">
               <a:rPr lang="en-US" dirty="0"/>
-              <a:t>2/4/2019</a:t>
+              <a:t>2/9/2019</a:t>
             </a:fld>
             <a:endParaRPr lang="en-US" dirty="0"/>
           </a:p>
@@ -933,7 +938,7 @@
           </a:lstStyle>
           <a:p>
             <a:r>
-              <a:rPr lang="de-DE" smtClean="0"/>
+              <a:rPr lang="de-DE"/>
               <a:t>Titelmasterformat durch Klicken bearbeiten</a:t>
             </a:r>
             <a:endParaRPr lang="en-US" dirty="0"/>
@@ -1001,7 +1006,7 @@
           <a:p>
             <a:pPr lvl="0"/>
             <a:r>
-              <a:rPr lang="de-DE" smtClean="0"/>
+              <a:rPr lang="de-DE"/>
               <a:t>Formatvorlagen des Textmasters bearbeiten</a:t>
             </a:r>
           </a:p>
@@ -1068,7 +1073,7 @@
           <a:p>
             <a:pPr lvl="0"/>
             <a:r>
-              <a:rPr lang="de-DE" smtClean="0"/>
+              <a:rPr lang="de-DE"/>
               <a:t>Formatvorlagen des Textmasters bearbeiten</a:t>
             </a:r>
           </a:p>
@@ -1091,7 +1096,7 @@
           <a:p>
             <a:fld id="{48A87A34-81AB-432B-8DAE-1953F412C126}" type="datetimeFigureOut">
               <a:rPr lang="en-US" dirty="0"/>
-              <a:t>2/4/2019</a:t>
+              <a:t>2/9/2019</a:t>
             </a:fld>
             <a:endParaRPr lang="en-US" dirty="0"/>
           </a:p>
@@ -1451,7 +1456,7 @@
           </a:lstStyle>
           <a:p>
             <a:r>
-              <a:rPr lang="de-DE" smtClean="0"/>
+              <a:rPr lang="de-DE"/>
               <a:t>Titelmasterformat durch Klicken bearbeiten</a:t>
             </a:r>
             <a:endParaRPr lang="en-US" dirty="0"/>
@@ -1517,7 +1522,7 @@
           <a:p>
             <a:pPr lvl="0"/>
             <a:r>
-              <a:rPr lang="de-DE" smtClean="0"/>
+              <a:rPr lang="de-DE"/>
               <a:t>Formatvorlagen des Textmasters bearbeiten</a:t>
             </a:r>
           </a:p>
@@ -1540,7 +1545,7 @@
           <a:p>
             <a:fld id="{48A87A34-81AB-432B-8DAE-1953F412C126}" type="datetimeFigureOut">
               <a:rPr lang="en-US" dirty="0"/>
-              <a:t>2/4/2019</a:t>
+              <a:t>2/9/2019</a:t>
             </a:fld>
             <a:endParaRPr lang="en-US" dirty="0"/>
           </a:p>
@@ -1664,7 +1669,7 @@
           <a:lstStyle/>
           <a:p>
             <a:r>
-              <a:rPr lang="de-DE" smtClean="0"/>
+              <a:rPr lang="de-DE"/>
               <a:t>Titelmasterformat durch Klicken bearbeiten</a:t>
             </a:r>
             <a:endParaRPr lang="en-US" dirty="0"/>
@@ -1739,7 +1744,7 @@
           <a:p>
             <a:pPr lvl="0"/>
             <a:r>
-              <a:rPr lang="de-DE" smtClean="0"/>
+              <a:rPr lang="de-DE"/>
               <a:t>Formatvorlagen des Textmasters bearbeiten</a:t>
             </a:r>
           </a:p>
@@ -1806,7 +1811,7 @@
           <a:p>
             <a:pPr lvl="0"/>
             <a:r>
-              <a:rPr lang="de-DE" smtClean="0"/>
+              <a:rPr lang="de-DE"/>
               <a:t>Formatvorlagen des Textmasters bearbeiten</a:t>
             </a:r>
           </a:p>
@@ -1880,7 +1885,7 @@
           <a:p>
             <a:pPr lvl="0"/>
             <a:r>
-              <a:rPr lang="de-DE" smtClean="0"/>
+              <a:rPr lang="de-DE"/>
               <a:t>Formatvorlagen des Textmasters bearbeiten</a:t>
             </a:r>
           </a:p>
@@ -1947,7 +1952,7 @@
           <a:p>
             <a:pPr lvl="0"/>
             <a:r>
-              <a:rPr lang="de-DE" smtClean="0"/>
+              <a:rPr lang="de-DE"/>
               <a:t>Formatvorlagen des Textmasters bearbeiten</a:t>
             </a:r>
           </a:p>
@@ -2021,7 +2026,7 @@
           <a:p>
             <a:pPr lvl="0"/>
             <a:r>
-              <a:rPr lang="de-DE" smtClean="0"/>
+              <a:rPr lang="de-DE"/>
               <a:t>Formatvorlagen des Textmasters bearbeiten</a:t>
             </a:r>
           </a:p>
@@ -2088,7 +2093,7 @@
           <a:p>
             <a:pPr lvl="0"/>
             <a:r>
-              <a:rPr lang="de-DE" smtClean="0"/>
+              <a:rPr lang="de-DE"/>
               <a:t>Formatvorlagen des Textmasters bearbeiten</a:t>
             </a:r>
           </a:p>
@@ -2111,7 +2116,7 @@
           <a:p>
             <a:fld id="{48A87A34-81AB-432B-8DAE-1953F412C126}" type="datetimeFigureOut">
               <a:rPr lang="en-US" dirty="0"/>
-              <a:t>2/4/2019</a:t>
+              <a:t>2/9/2019</a:t>
             </a:fld>
             <a:endParaRPr lang="en-US" dirty="0"/>
           </a:p>
@@ -2235,7 +2240,7 @@
           <a:lstStyle/>
           <a:p>
             <a:r>
-              <a:rPr lang="de-DE" smtClean="0"/>
+              <a:rPr lang="de-DE"/>
               <a:t>Titelmasterformat durch Klicken bearbeiten</a:t>
             </a:r>
             <a:endParaRPr lang="en-US" dirty="0"/>
@@ -2310,7 +2315,7 @@
           <a:p>
             <a:pPr lvl="0"/>
             <a:r>
-              <a:rPr lang="de-DE" smtClean="0"/>
+              <a:rPr lang="de-DE"/>
               <a:t>Formatvorlagen des Textmasters bearbeiten</a:t>
             </a:r>
           </a:p>
@@ -2401,7 +2406,7 @@
           </a:lstStyle>
           <a:p>
             <a:r>
-              <a:rPr lang="de-DE" smtClean="0"/>
+              <a:rPr lang="de-DE"/>
               <a:t>Bild durch Klicken auf Symbol hinzufügen</a:t>
             </a:r>
             <a:endParaRPr lang="en-US" dirty="0"/>
@@ -2469,7 +2474,7 @@
           <a:p>
             <a:pPr lvl="0"/>
             <a:r>
-              <a:rPr lang="de-DE" smtClean="0"/>
+              <a:rPr lang="de-DE"/>
               <a:t>Formatvorlagen des Textmasters bearbeiten</a:t>
             </a:r>
           </a:p>
@@ -2543,7 +2548,7 @@
           <a:p>
             <a:pPr lvl="0"/>
             <a:r>
-              <a:rPr lang="de-DE" smtClean="0"/>
+              <a:rPr lang="de-DE"/>
               <a:t>Formatvorlagen des Textmasters bearbeiten</a:t>
             </a:r>
           </a:p>
@@ -2634,7 +2639,7 @@
           </a:lstStyle>
           <a:p>
             <a:r>
-              <a:rPr lang="de-DE" smtClean="0"/>
+              <a:rPr lang="de-DE"/>
               <a:t>Bild durch Klicken auf Symbol hinzufügen</a:t>
             </a:r>
             <a:endParaRPr lang="en-US" dirty="0"/>
@@ -2702,7 +2707,7 @@
           <a:p>
             <a:pPr lvl="0"/>
             <a:r>
-              <a:rPr lang="de-DE" smtClean="0"/>
+              <a:rPr lang="de-DE"/>
               <a:t>Formatvorlagen des Textmasters bearbeiten</a:t>
             </a:r>
           </a:p>
@@ -2776,7 +2781,7 @@
           <a:p>
             <a:pPr lvl="0"/>
             <a:r>
-              <a:rPr lang="de-DE" smtClean="0"/>
+              <a:rPr lang="de-DE"/>
               <a:t>Formatvorlagen des Textmasters bearbeiten</a:t>
             </a:r>
           </a:p>
@@ -2867,7 +2872,7 @@
           </a:lstStyle>
           <a:p>
             <a:r>
-              <a:rPr lang="de-DE" smtClean="0"/>
+              <a:rPr lang="de-DE"/>
               <a:t>Bild durch Klicken auf Symbol hinzufügen</a:t>
             </a:r>
             <a:endParaRPr lang="en-US" dirty="0"/>
@@ -2935,7 +2940,7 @@
           <a:p>
             <a:pPr lvl="0"/>
             <a:r>
-              <a:rPr lang="de-DE" smtClean="0"/>
+              <a:rPr lang="de-DE"/>
               <a:t>Formatvorlagen des Textmasters bearbeiten</a:t>
             </a:r>
           </a:p>
@@ -2958,7 +2963,7 @@
           <a:p>
             <a:fld id="{48A87A34-81AB-432B-8DAE-1953F412C126}" type="datetimeFigureOut">
               <a:rPr lang="en-US" dirty="0"/>
-              <a:t>2/4/2019</a:t>
+              <a:t>2/9/2019</a:t>
             </a:fld>
             <a:endParaRPr lang="en-US" dirty="0"/>
           </a:p>
@@ -3077,7 +3082,7 @@
           <a:lstStyle/>
           <a:p>
             <a:r>
-              <a:rPr lang="de-DE" smtClean="0"/>
+              <a:rPr lang="de-DE"/>
               <a:t>Titelmasterformat durch Klicken bearbeiten</a:t>
             </a:r>
             <a:endParaRPr lang="en-US" dirty="0"/>
@@ -3106,35 +3111,35 @@
           <a:p>
             <a:pPr lvl="0"/>
             <a:r>
-              <a:rPr lang="de-DE" smtClean="0"/>
+              <a:rPr lang="de-DE"/>
               <a:t>Formatvorlagen des Textmasters bearbeiten</a:t>
             </a:r>
           </a:p>
           <a:p>
             <a:pPr lvl="1"/>
             <a:r>
-              <a:rPr lang="de-DE" smtClean="0"/>
+              <a:rPr lang="de-DE"/>
               <a:t>Zweite Ebene</a:t>
             </a:r>
           </a:p>
           <a:p>
             <a:pPr lvl="2"/>
             <a:r>
-              <a:rPr lang="de-DE" smtClean="0"/>
+              <a:rPr lang="de-DE"/>
               <a:t>Dritte Ebene</a:t>
             </a:r>
           </a:p>
           <a:p>
             <a:pPr lvl="3"/>
             <a:r>
-              <a:rPr lang="de-DE" smtClean="0"/>
+              <a:rPr lang="de-DE"/>
               <a:t>Vierte Ebene</a:t>
             </a:r>
           </a:p>
           <a:p>
             <a:pPr lvl="4"/>
             <a:r>
-              <a:rPr lang="de-DE" smtClean="0"/>
+              <a:rPr lang="de-DE"/>
               <a:t>Fünfte Ebene</a:t>
             </a:r>
             <a:endParaRPr lang="en-US" dirty="0"/>
@@ -3158,7 +3163,7 @@
           <a:p>
             <a:fld id="{48A87A34-81AB-432B-8DAE-1953F412C126}" type="datetimeFigureOut">
               <a:rPr lang="en-US" dirty="0"/>
-              <a:t>2/4/2019</a:t>
+              <a:t>2/9/2019</a:t>
             </a:fld>
             <a:endParaRPr lang="en-US" dirty="0"/>
           </a:p>
@@ -3286,7 +3291,7 @@
           </a:lstStyle>
           <a:p>
             <a:r>
-              <a:rPr lang="de-DE" smtClean="0"/>
+              <a:rPr lang="de-DE"/>
               <a:t>Titelmasterformat durch Klicken bearbeiten</a:t>
             </a:r>
             <a:endParaRPr lang="en-US" dirty="0"/>
@@ -3315,35 +3320,35 @@
           <a:p>
             <a:pPr lvl="0"/>
             <a:r>
-              <a:rPr lang="de-DE" smtClean="0"/>
+              <a:rPr lang="de-DE"/>
               <a:t>Formatvorlagen des Textmasters bearbeiten</a:t>
             </a:r>
           </a:p>
           <a:p>
             <a:pPr lvl="1"/>
             <a:r>
-              <a:rPr lang="de-DE" smtClean="0"/>
+              <a:rPr lang="de-DE"/>
               <a:t>Zweite Ebene</a:t>
             </a:r>
           </a:p>
           <a:p>
             <a:pPr lvl="2"/>
             <a:r>
-              <a:rPr lang="de-DE" smtClean="0"/>
+              <a:rPr lang="de-DE"/>
               <a:t>Dritte Ebene</a:t>
             </a:r>
           </a:p>
           <a:p>
             <a:pPr lvl="3"/>
             <a:r>
-              <a:rPr lang="de-DE" smtClean="0"/>
+              <a:rPr lang="de-DE"/>
               <a:t>Vierte Ebene</a:t>
             </a:r>
           </a:p>
           <a:p>
             <a:pPr lvl="4"/>
             <a:r>
-              <a:rPr lang="de-DE" smtClean="0"/>
+              <a:rPr lang="de-DE"/>
               <a:t>Fünfte Ebene</a:t>
             </a:r>
             <a:endParaRPr lang="en-US" dirty="0"/>
@@ -3367,7 +3372,7 @@
           <a:p>
             <a:fld id="{48A87A34-81AB-432B-8DAE-1953F412C126}" type="datetimeFigureOut">
               <a:rPr lang="en-US" dirty="0"/>
-              <a:t>2/4/2019</a:t>
+              <a:t>2/9/2019</a:t>
             </a:fld>
             <a:endParaRPr lang="en-US" dirty="0"/>
           </a:p>
@@ -3486,7 +3491,7 @@
           <a:lstStyle/>
           <a:p>
             <a:r>
-              <a:rPr lang="de-DE" smtClean="0"/>
+              <a:rPr lang="de-DE"/>
               <a:t>Titelmasterformat durch Klicken bearbeiten</a:t>
             </a:r>
             <a:endParaRPr lang="en-US" dirty="0"/>
@@ -3515,35 +3520,35 @@
           <a:p>
             <a:pPr lvl="0"/>
             <a:r>
-              <a:rPr lang="de-DE" smtClean="0"/>
+              <a:rPr lang="de-DE"/>
               <a:t>Formatvorlagen des Textmasters bearbeiten</a:t>
             </a:r>
           </a:p>
           <a:p>
             <a:pPr lvl="1"/>
             <a:r>
-              <a:rPr lang="de-DE" smtClean="0"/>
+              <a:rPr lang="de-DE"/>
               <a:t>Zweite Ebene</a:t>
             </a:r>
           </a:p>
           <a:p>
             <a:pPr lvl="2"/>
             <a:r>
-              <a:rPr lang="de-DE" smtClean="0"/>
+              <a:rPr lang="de-DE"/>
               <a:t>Dritte Ebene</a:t>
             </a:r>
           </a:p>
           <a:p>
             <a:pPr lvl="3"/>
             <a:r>
-              <a:rPr lang="de-DE" smtClean="0"/>
+              <a:rPr lang="de-DE"/>
               <a:t>Vierte Ebene</a:t>
             </a:r>
           </a:p>
           <a:p>
             <a:pPr lvl="4"/>
             <a:r>
-              <a:rPr lang="de-DE" smtClean="0"/>
+              <a:rPr lang="de-DE"/>
               <a:t>Fünfte Ebene</a:t>
             </a:r>
             <a:endParaRPr lang="en-US" dirty="0"/>
@@ -3567,7 +3572,7 @@
           <a:p>
             <a:fld id="{48A87A34-81AB-432B-8DAE-1953F412C126}" type="datetimeFigureOut">
               <a:rPr lang="en-US" dirty="0"/>
-              <a:t>2/4/2019</a:t>
+              <a:t>2/9/2019</a:t>
             </a:fld>
             <a:endParaRPr lang="en-US" dirty="0"/>
           </a:p>
@@ -3697,7 +3702,7 @@
           </a:lstStyle>
           <a:p>
             <a:r>
-              <a:rPr lang="de-DE" smtClean="0"/>
+              <a:rPr lang="de-DE"/>
               <a:t>Titelmasterformat durch Klicken bearbeiten</a:t>
             </a:r>
             <a:endParaRPr lang="en-US" dirty="0"/>
@@ -3819,7 +3824,7 @@
           <a:p>
             <a:pPr lvl="0"/>
             <a:r>
-              <a:rPr lang="de-DE" smtClean="0"/>
+              <a:rPr lang="de-DE"/>
               <a:t>Formatvorlagen des Textmasters bearbeiten</a:t>
             </a:r>
           </a:p>
@@ -3842,7 +3847,7 @@
           <a:p>
             <a:fld id="{48A87A34-81AB-432B-8DAE-1953F412C126}" type="datetimeFigureOut">
               <a:rPr lang="en-US" dirty="0"/>
-              <a:t>2/4/2019</a:t>
+              <a:t>2/9/2019</a:t>
             </a:fld>
             <a:endParaRPr lang="en-US" dirty="0"/>
           </a:p>
@@ -3966,7 +3971,7 @@
           <a:lstStyle/>
           <a:p>
             <a:r>
-              <a:rPr lang="de-DE" smtClean="0"/>
+              <a:rPr lang="de-DE"/>
               <a:t>Titelmasterformat durch Klicken bearbeiten</a:t>
             </a:r>
             <a:endParaRPr lang="en-US" dirty="0"/>
@@ -3995,35 +4000,35 @@
           <a:p>
             <a:pPr lvl="0"/>
             <a:r>
-              <a:rPr lang="de-DE" smtClean="0"/>
+              <a:rPr lang="de-DE"/>
               <a:t>Formatvorlagen des Textmasters bearbeiten</a:t>
             </a:r>
           </a:p>
           <a:p>
             <a:pPr lvl="1"/>
             <a:r>
-              <a:rPr lang="de-DE" smtClean="0"/>
+              <a:rPr lang="de-DE"/>
               <a:t>Zweite Ebene</a:t>
             </a:r>
           </a:p>
           <a:p>
             <a:pPr lvl="2"/>
             <a:r>
-              <a:rPr lang="de-DE" smtClean="0"/>
+              <a:rPr lang="de-DE"/>
               <a:t>Dritte Ebene</a:t>
             </a:r>
           </a:p>
           <a:p>
             <a:pPr lvl="3"/>
             <a:r>
-              <a:rPr lang="de-DE" smtClean="0"/>
+              <a:rPr lang="de-DE"/>
               <a:t>Vierte Ebene</a:t>
             </a:r>
           </a:p>
           <a:p>
             <a:pPr lvl="4"/>
             <a:r>
-              <a:rPr lang="de-DE" smtClean="0"/>
+              <a:rPr lang="de-DE"/>
               <a:t>Fünfte Ebene</a:t>
             </a:r>
             <a:endParaRPr lang="en-US" dirty="0"/>
@@ -4052,35 +4057,35 @@
           <a:p>
             <a:pPr lvl="0"/>
             <a:r>
-              <a:rPr lang="de-DE" smtClean="0"/>
+              <a:rPr lang="de-DE"/>
               <a:t>Formatvorlagen des Textmasters bearbeiten</a:t>
             </a:r>
           </a:p>
           <a:p>
             <a:pPr lvl="1"/>
             <a:r>
-              <a:rPr lang="de-DE" smtClean="0"/>
+              <a:rPr lang="de-DE"/>
               <a:t>Zweite Ebene</a:t>
             </a:r>
           </a:p>
           <a:p>
             <a:pPr lvl="2"/>
             <a:r>
-              <a:rPr lang="de-DE" smtClean="0"/>
+              <a:rPr lang="de-DE"/>
               <a:t>Dritte Ebene</a:t>
             </a:r>
           </a:p>
           <a:p>
             <a:pPr lvl="3"/>
             <a:r>
-              <a:rPr lang="de-DE" smtClean="0"/>
+              <a:rPr lang="de-DE"/>
               <a:t>Vierte Ebene</a:t>
             </a:r>
           </a:p>
           <a:p>
             <a:pPr lvl="4"/>
             <a:r>
-              <a:rPr lang="de-DE" smtClean="0"/>
+              <a:rPr lang="de-DE"/>
               <a:t>Fünfte Ebene</a:t>
             </a:r>
             <a:endParaRPr lang="en-US" dirty="0"/>
@@ -4104,7 +4109,7 @@
           <a:p>
             <a:fld id="{48A87A34-81AB-432B-8DAE-1953F412C126}" type="datetimeFigureOut">
               <a:rPr lang="en-US" dirty="0"/>
-              <a:t>2/4/2019</a:t>
+              <a:t>2/9/2019</a:t>
             </a:fld>
             <a:endParaRPr lang="en-US" dirty="0"/>
           </a:p>
@@ -4228,7 +4233,7 @@
           <a:lstStyle/>
           <a:p>
             <a:r>
-              <a:rPr lang="de-DE" smtClean="0"/>
+              <a:rPr lang="de-DE"/>
               <a:t>Titelmasterformat durch Klicken bearbeiten</a:t>
             </a:r>
             <a:endParaRPr lang="en-US" dirty="0"/>
@@ -4303,7 +4308,7 @@
           <a:p>
             <a:pPr lvl="0"/>
             <a:r>
-              <a:rPr lang="de-DE" smtClean="0"/>
+              <a:rPr lang="de-DE"/>
               <a:t>Formatvorlagen des Textmasters bearbeiten</a:t>
             </a:r>
           </a:p>
@@ -4331,35 +4336,35 @@
           <a:p>
             <a:pPr lvl="0"/>
             <a:r>
-              <a:rPr lang="de-DE" smtClean="0"/>
+              <a:rPr lang="de-DE"/>
               <a:t>Formatvorlagen des Textmasters bearbeiten</a:t>
             </a:r>
           </a:p>
           <a:p>
             <a:pPr lvl="1"/>
             <a:r>
-              <a:rPr lang="de-DE" smtClean="0"/>
+              <a:rPr lang="de-DE"/>
               <a:t>Zweite Ebene</a:t>
             </a:r>
           </a:p>
           <a:p>
             <a:pPr lvl="2"/>
             <a:r>
-              <a:rPr lang="de-DE" smtClean="0"/>
+              <a:rPr lang="de-DE"/>
               <a:t>Dritte Ebene</a:t>
             </a:r>
           </a:p>
           <a:p>
             <a:pPr lvl="3"/>
             <a:r>
-              <a:rPr lang="de-DE" smtClean="0"/>
+              <a:rPr lang="de-DE"/>
               <a:t>Vierte Ebene</a:t>
             </a:r>
           </a:p>
           <a:p>
             <a:pPr lvl="4"/>
             <a:r>
-              <a:rPr lang="de-DE" smtClean="0"/>
+              <a:rPr lang="de-DE"/>
               <a:t>Fünfte Ebene</a:t>
             </a:r>
             <a:endParaRPr lang="en-US" dirty="0"/>
@@ -4434,7 +4439,7 @@
           <a:p>
             <a:pPr lvl="0"/>
             <a:r>
-              <a:rPr lang="de-DE" smtClean="0"/>
+              <a:rPr lang="de-DE"/>
               <a:t>Formatvorlagen des Textmasters bearbeiten</a:t>
             </a:r>
           </a:p>
@@ -4462,35 +4467,35 @@
           <a:p>
             <a:pPr lvl="0"/>
             <a:r>
-              <a:rPr lang="de-DE" smtClean="0"/>
+              <a:rPr lang="de-DE"/>
               <a:t>Formatvorlagen des Textmasters bearbeiten</a:t>
             </a:r>
           </a:p>
           <a:p>
             <a:pPr lvl="1"/>
             <a:r>
-              <a:rPr lang="de-DE" smtClean="0"/>
+              <a:rPr lang="de-DE"/>
               <a:t>Zweite Ebene</a:t>
             </a:r>
           </a:p>
           <a:p>
             <a:pPr lvl="2"/>
             <a:r>
-              <a:rPr lang="de-DE" smtClean="0"/>
+              <a:rPr lang="de-DE"/>
               <a:t>Dritte Ebene</a:t>
             </a:r>
           </a:p>
           <a:p>
             <a:pPr lvl="3"/>
             <a:r>
-              <a:rPr lang="de-DE" smtClean="0"/>
+              <a:rPr lang="de-DE"/>
               <a:t>Vierte Ebene</a:t>
             </a:r>
           </a:p>
           <a:p>
             <a:pPr lvl="4"/>
             <a:r>
-              <a:rPr lang="de-DE" smtClean="0"/>
+              <a:rPr lang="de-DE"/>
               <a:t>Fünfte Ebene</a:t>
             </a:r>
             <a:endParaRPr lang="en-US" dirty="0"/>
@@ -4514,7 +4519,7 @@
           <a:p>
             <a:fld id="{48A87A34-81AB-432B-8DAE-1953F412C126}" type="datetimeFigureOut">
               <a:rPr lang="en-US" dirty="0"/>
-              <a:t>2/4/2019</a:t>
+              <a:t>2/9/2019</a:t>
             </a:fld>
             <a:endParaRPr lang="en-US" dirty="0"/>
           </a:p>
@@ -4633,7 +4638,7 @@
           <a:lstStyle/>
           <a:p>
             <a:r>
-              <a:rPr lang="de-DE" smtClean="0"/>
+              <a:rPr lang="de-DE"/>
               <a:t>Titelmasterformat durch Klicken bearbeiten</a:t>
             </a:r>
             <a:endParaRPr lang="en-US" dirty="0"/>
@@ -4657,7 +4662,7 @@
           <a:p>
             <a:fld id="{48A87A34-81AB-432B-8DAE-1953F412C126}" type="datetimeFigureOut">
               <a:rPr lang="en-US" dirty="0"/>
-              <a:t>2/4/2019</a:t>
+              <a:t>2/9/2019</a:t>
             </a:fld>
             <a:endParaRPr lang="en-US" dirty="0"/>
           </a:p>
@@ -4777,7 +4782,7 @@
           <a:p>
             <a:fld id="{48A87A34-81AB-432B-8DAE-1953F412C126}" type="datetimeFigureOut">
               <a:rPr lang="en-US" dirty="0"/>
-              <a:t>2/4/2019</a:t>
+              <a:t>2/9/2019</a:t>
             </a:fld>
             <a:endParaRPr lang="en-US" dirty="0"/>
           </a:p>
@@ -4905,7 +4910,7 @@
           </a:lstStyle>
           <a:p>
             <a:r>
-              <a:rPr lang="de-DE" smtClean="0"/>
+              <a:rPr lang="de-DE"/>
               <a:t>Titelmasterformat durch Klicken bearbeiten</a:t>
             </a:r>
             <a:endParaRPr lang="en-US" dirty="0"/>
@@ -4934,35 +4939,35 @@
           <a:p>
             <a:pPr lvl="0"/>
             <a:r>
-              <a:rPr lang="de-DE" smtClean="0"/>
+              <a:rPr lang="de-DE"/>
               <a:t>Formatvorlagen des Textmasters bearbeiten</a:t>
             </a:r>
           </a:p>
           <a:p>
             <a:pPr lvl="1"/>
             <a:r>
-              <a:rPr lang="de-DE" smtClean="0"/>
+              <a:rPr lang="de-DE"/>
               <a:t>Zweite Ebene</a:t>
             </a:r>
           </a:p>
           <a:p>
             <a:pPr lvl="2"/>
             <a:r>
-              <a:rPr lang="de-DE" smtClean="0"/>
+              <a:rPr lang="de-DE"/>
               <a:t>Dritte Ebene</a:t>
             </a:r>
           </a:p>
           <a:p>
             <a:pPr lvl="3"/>
             <a:r>
-              <a:rPr lang="de-DE" smtClean="0"/>
+              <a:rPr lang="de-DE"/>
               <a:t>Vierte Ebene</a:t>
             </a:r>
           </a:p>
           <a:p>
             <a:pPr lvl="4"/>
             <a:r>
-              <a:rPr lang="de-DE" smtClean="0"/>
+              <a:rPr lang="de-DE"/>
               <a:t>Fünfte Ebene</a:t>
             </a:r>
             <a:endParaRPr lang="en-US" dirty="0"/>
@@ -5028,7 +5033,7 @@
           <a:p>
             <a:pPr lvl="0"/>
             <a:r>
-              <a:rPr lang="de-DE" smtClean="0"/>
+              <a:rPr lang="de-DE"/>
               <a:t>Formatvorlagen des Textmasters bearbeiten</a:t>
             </a:r>
           </a:p>
@@ -5051,7 +5056,7 @@
           <a:p>
             <a:fld id="{48A87A34-81AB-432B-8DAE-1953F412C126}" type="datetimeFigureOut">
               <a:rPr lang="en-US" dirty="0"/>
-              <a:t>2/4/2019</a:t>
+              <a:t>2/9/2019</a:t>
             </a:fld>
             <a:endParaRPr lang="en-US" dirty="0"/>
           </a:p>
@@ -5179,7 +5184,7 @@
           </a:lstStyle>
           <a:p>
             <a:r>
-              <a:rPr lang="de-DE" smtClean="0"/>
+              <a:rPr lang="de-DE"/>
               <a:t>Titelmasterformat durch Klicken bearbeiten</a:t>
             </a:r>
             <a:endParaRPr lang="en-US" dirty="0"/>
@@ -5269,7 +5274,7 @@
           </a:lstStyle>
           <a:p>
             <a:r>
-              <a:rPr lang="de-DE" smtClean="0"/>
+              <a:rPr lang="de-DE"/>
               <a:t>Bild durch Klicken auf Symbol hinzufügen</a:t>
             </a:r>
             <a:endParaRPr lang="en-US" dirty="0"/>
@@ -5335,7 +5340,7 @@
           <a:p>
             <a:pPr lvl="0"/>
             <a:r>
-              <a:rPr lang="de-DE" smtClean="0"/>
+              <a:rPr lang="de-DE"/>
               <a:t>Formatvorlagen des Textmasters bearbeiten</a:t>
             </a:r>
           </a:p>
@@ -5358,7 +5363,7 @@
           <a:p>
             <a:fld id="{48A87A34-81AB-432B-8DAE-1953F412C126}" type="datetimeFigureOut">
               <a:rPr lang="en-US" dirty="0"/>
-              <a:t>2/4/2019</a:t>
+              <a:t>2/9/2019</a:t>
             </a:fld>
             <a:endParaRPr lang="en-US" dirty="0"/>
           </a:p>
@@ -5504,7 +5509,7 @@
           <a:lstStyle/>
           <a:p>
             <a:r>
-              <a:rPr lang="de-DE" smtClean="0"/>
+              <a:rPr lang="de-DE"/>
               <a:t>Titelmasterformat durch Klicken bearbeiten</a:t>
             </a:r>
             <a:endParaRPr lang="en-US" dirty="0"/>
@@ -5538,35 +5543,35 @@
           <a:p>
             <a:pPr lvl="0"/>
             <a:r>
-              <a:rPr lang="de-DE" smtClean="0"/>
+              <a:rPr lang="de-DE"/>
               <a:t>Formatvorlagen des Textmasters bearbeiten</a:t>
             </a:r>
           </a:p>
           <a:p>
             <a:pPr lvl="1"/>
             <a:r>
-              <a:rPr lang="de-DE" smtClean="0"/>
+              <a:rPr lang="de-DE"/>
               <a:t>Zweite Ebene</a:t>
             </a:r>
           </a:p>
           <a:p>
             <a:pPr lvl="2"/>
             <a:r>
-              <a:rPr lang="de-DE" smtClean="0"/>
+              <a:rPr lang="de-DE"/>
               <a:t>Dritte Ebene</a:t>
             </a:r>
           </a:p>
           <a:p>
             <a:pPr lvl="3"/>
             <a:r>
-              <a:rPr lang="de-DE" smtClean="0"/>
+              <a:rPr lang="de-DE"/>
               <a:t>Vierte Ebene</a:t>
             </a:r>
           </a:p>
           <a:p>
             <a:pPr lvl="4"/>
             <a:r>
-              <a:rPr lang="de-DE" smtClean="0"/>
+              <a:rPr lang="de-DE"/>
               <a:t>Fünfte Ebene</a:t>
             </a:r>
             <a:endParaRPr lang="en-US" dirty="0"/>
@@ -5607,7 +5612,7 @@
             <a:fld id="{48A87A34-81AB-432B-8DAE-1953F412C126}" type="datetimeFigureOut">
               <a:rPr lang="en-US" dirty="0"/>
               <a:pPr/>
-              <a:t>2/4/2019</a:t>
+              <a:t>2/9/2019</a:t>
             </a:fld>
             <a:endParaRPr lang="en-US" dirty="0"/>
           </a:p>
@@ -6047,6 +6052,36 @@
           <a:chExt cx="0" cy="0"/>
         </a:xfrm>
       </p:grpSpPr>
+      <p:pic>
+        <p:nvPicPr>
+          <p:cNvPr id="5" name="Grafik 4">
+            <a:extLst>
+              <a:ext uri="{FF2B5EF4-FFF2-40B4-BE49-F238E27FC236}">
+                <a16:creationId xmlns:a16="http://schemas.microsoft.com/office/drawing/2014/main" id="{C8A9653C-3E96-4C30-82DE-B9DED13CB328}"/>
+              </a:ext>
+            </a:extLst>
+          </p:cNvPr>
+          <p:cNvPicPr>
+            <a:picLocks noChangeAspect="1"/>
+          </p:cNvPicPr>
+          <p:nvPr/>
+        </p:nvPicPr>
+        <p:blipFill>
+          <a:blip r:embed="rId2"/>
+          <a:stretch>
+            <a:fillRect/>
+          </a:stretch>
+        </p:blipFill>
+        <p:spPr>
+          <a:xfrm>
+            <a:off x="0" y="6096"/>
+            <a:ext cx="12192000" cy="8125588"/>
+          </a:xfrm>
+          <a:prstGeom prst="rect">
+            <a:avLst/>
+          </a:prstGeom>
+        </p:spPr>
+      </p:pic>
       <p:sp>
         <p:nvSpPr>
           <p:cNvPr id="2" name="Titel 1"/>
@@ -6059,7 +6094,7 @@
         </p:nvSpPr>
         <p:spPr>
           <a:xfrm>
-            <a:off x="1751012" y="821814"/>
+            <a:off x="-457616" y="-148856"/>
             <a:ext cx="8689976" cy="2509213"/>
           </a:xfrm>
         </p:spPr>
@@ -6068,14 +6103,26 @@
           <a:lstStyle/>
           <a:p>
             <a:r>
-              <a:rPr lang="de-DE" dirty="0" smtClean="0"/>
+              <a:rPr lang="de-DE" dirty="0">
+                <a:solidFill>
+                  <a:schemeClr val="bg1"/>
+                </a:solidFill>
+              </a:rPr>
               <a:t>Urban </a:t>
             </a:r>
             <a:r>
-              <a:rPr lang="de-DE" dirty="0" err="1" smtClean="0"/>
+              <a:rPr lang="de-DE" dirty="0" err="1">
+                <a:solidFill>
+                  <a:schemeClr val="bg1"/>
+                </a:solidFill>
+              </a:rPr>
               <a:t>explorer</a:t>
             </a:r>
-            <a:endParaRPr lang="de-DE" dirty="0"/>
+            <a:endParaRPr lang="de-DE" dirty="0">
+              <a:solidFill>
+                <a:schemeClr val="bg1"/>
+              </a:solidFill>
+            </a:endParaRPr>
           </a:p>
         </p:txBody>
       </p:sp>
@@ -6091,7 +6138,7 @@
         </p:nvSpPr>
         <p:spPr>
           <a:xfrm>
-            <a:off x="1751012" y="3331027"/>
+            <a:off x="-457616" y="2360357"/>
             <a:ext cx="8689976" cy="1371599"/>
           </a:xfrm>
         </p:spPr>
@@ -6102,17 +6149,41 @@
           <a:lstStyle/>
           <a:p>
             <a:r>
-              <a:rPr lang="de-DE" dirty="0" smtClean="0"/>
+              <a:rPr lang="de-DE" dirty="0">
+                <a:solidFill>
+                  <a:schemeClr val="accent6">
+                    <a:lumMod val="50000"/>
+                  </a:schemeClr>
+                </a:solidFill>
+              </a:rPr>
               <a:t>Dein perfekter tag in einer fremden </a:t>
             </a:r>
             <a:r>
-              <a:rPr lang="de-DE" dirty="0" err="1" smtClean="0"/>
+              <a:rPr lang="de-DE" dirty="0" err="1">
+                <a:solidFill>
+                  <a:schemeClr val="accent6">
+                    <a:lumMod val="50000"/>
+                  </a:schemeClr>
+                </a:solidFill>
+              </a:rPr>
               <a:t>stadt</a:t>
             </a:r>
-            <a:endParaRPr lang="de-DE" dirty="0" smtClean="0"/>
-          </a:p>
-          <a:p>
-            <a:endParaRPr lang="de-DE" dirty="0"/>
+            <a:endParaRPr lang="de-DE" dirty="0">
+              <a:solidFill>
+                <a:schemeClr val="accent6">
+                  <a:lumMod val="50000"/>
+                </a:schemeClr>
+              </a:solidFill>
+            </a:endParaRPr>
+          </a:p>
+          <a:p>
+            <a:endParaRPr lang="de-DE" dirty="0">
+              <a:solidFill>
+                <a:schemeClr val="bg1">
+                  <a:lumMod val="95000"/>
+                </a:schemeClr>
+              </a:solidFill>
+            </a:endParaRPr>
           </a:p>
           <a:p>
             <a:endParaRPr lang="de-DE" dirty="0"/>
@@ -6165,11 +6236,11 @@
           <a:lstStyle/>
           <a:p>
             <a:r>
-              <a:rPr lang="de-DE" dirty="0" smtClean="0"/>
+              <a:rPr lang="de-DE" dirty="0"/>
               <a:t>Vorstellung der </a:t>
             </a:r>
             <a:r>
-              <a:rPr lang="de-DE" dirty="0" err="1" smtClean="0"/>
+              <a:rPr lang="de-DE" dirty="0" err="1"/>
               <a:t>teammitglieder</a:t>
             </a:r>
             <a:endParaRPr lang="de-DE" dirty="0"/>
@@ -6192,45 +6263,45 @@
           <a:lstStyle/>
           <a:p>
             <a:r>
-              <a:rPr lang="de-DE" dirty="0" smtClean="0"/>
+              <a:rPr lang="de-DE" dirty="0"/>
               <a:t>Salam al </a:t>
             </a:r>
             <a:r>
-              <a:rPr lang="de-DE" dirty="0" err="1" smtClean="0"/>
+              <a:rPr lang="de-DE" dirty="0" err="1"/>
               <a:t>haloud</a:t>
             </a:r>
-            <a:endParaRPr lang="de-DE" dirty="0" smtClean="0"/>
-          </a:p>
-          <a:p>
-            <a:r>
-              <a:rPr lang="de-DE" dirty="0" smtClean="0"/>
+            <a:endParaRPr lang="de-DE" dirty="0"/>
+          </a:p>
+          <a:p>
+            <a:r>
+              <a:rPr lang="de-DE" dirty="0"/>
               <a:t>Sven hornung</a:t>
             </a:r>
           </a:p>
           <a:p>
             <a:r>
-              <a:rPr lang="de-DE" dirty="0" smtClean="0"/>
+              <a:rPr lang="de-DE" dirty="0"/>
               <a:t>Stefan Roth</a:t>
             </a:r>
           </a:p>
           <a:p>
             <a:r>
-              <a:rPr lang="de-DE" dirty="0" smtClean="0"/>
+              <a:rPr lang="de-DE" dirty="0"/>
               <a:t>Niklas </a:t>
             </a:r>
             <a:r>
-              <a:rPr lang="de-DE" dirty="0" err="1" smtClean="0"/>
+              <a:rPr lang="de-DE" dirty="0" err="1"/>
               <a:t>fichtner</a:t>
             </a:r>
-            <a:endParaRPr lang="de-DE" dirty="0" smtClean="0"/>
-          </a:p>
-          <a:p>
-            <a:r>
-              <a:rPr lang="de-DE" dirty="0" smtClean="0"/>
+            <a:endParaRPr lang="de-DE" dirty="0"/>
+          </a:p>
+          <a:p>
+            <a:r>
+              <a:rPr lang="de-DE" dirty="0"/>
               <a:t>Daniel </a:t>
             </a:r>
             <a:r>
-              <a:rPr lang="de-DE" dirty="0" err="1" smtClean="0"/>
+              <a:rPr lang="de-DE" dirty="0" err="1"/>
               <a:t>wenzl</a:t>
             </a:r>
             <a:endParaRPr lang="de-DE" dirty="0"/>
@@ -6283,11 +6354,11 @@
           <a:lstStyle/>
           <a:p>
             <a:r>
-              <a:rPr lang="de-DE" dirty="0" smtClean="0"/>
+              <a:rPr lang="de-DE" dirty="0"/>
               <a:t>Die </a:t>
             </a:r>
             <a:r>
-              <a:rPr lang="de-DE" dirty="0" err="1" smtClean="0"/>
+              <a:rPr lang="de-DE" dirty="0" err="1"/>
               <a:t>idee</a:t>
             </a:r>
             <a:endParaRPr lang="de-DE" dirty="0"/>
@@ -6310,55 +6381,55 @@
           <a:lstStyle/>
           <a:p>
             <a:r>
-              <a:rPr lang="de-DE" dirty="0" smtClean="0"/>
+              <a:rPr lang="de-DE" dirty="0"/>
               <a:t>Tagesplanungen für einen </a:t>
             </a:r>
             <a:r>
-              <a:rPr lang="de-DE" dirty="0" err="1" smtClean="0"/>
+              <a:rPr lang="de-DE" dirty="0" err="1"/>
               <a:t>städtetrip</a:t>
             </a:r>
-            <a:endParaRPr lang="de-DE" dirty="0" smtClean="0"/>
-          </a:p>
-          <a:p>
-            <a:r>
-              <a:rPr lang="de-DE" dirty="0" smtClean="0"/>
+            <a:endParaRPr lang="de-DE" dirty="0"/>
+          </a:p>
+          <a:p>
+            <a:r>
+              <a:rPr lang="de-DE" dirty="0"/>
               <a:t>Eingabe Stadt -&gt; Nach </a:t>
             </a:r>
             <a:r>
-              <a:rPr lang="de-DE" dirty="0" err="1" smtClean="0"/>
+              <a:rPr lang="de-DE" dirty="0" err="1"/>
               <a:t>eingabe</a:t>
             </a:r>
             <a:r>
-              <a:rPr lang="de-DE" dirty="0" smtClean="0"/>
+              <a:rPr lang="de-DE" dirty="0"/>
               <a:t> erscheint ein </a:t>
             </a:r>
             <a:r>
-              <a:rPr lang="de-DE" dirty="0" err="1" smtClean="0"/>
+              <a:rPr lang="de-DE" dirty="0" err="1"/>
               <a:t>hintergrundbild</a:t>
             </a:r>
             <a:r>
-              <a:rPr lang="de-DE" dirty="0" smtClean="0"/>
+              <a:rPr lang="de-DE" dirty="0"/>
               <a:t> von der </a:t>
             </a:r>
             <a:r>
-              <a:rPr lang="de-DE" dirty="0" err="1" smtClean="0"/>
+              <a:rPr lang="de-DE" dirty="0" err="1"/>
               <a:t>stadt</a:t>
             </a:r>
-            <a:endParaRPr lang="de-DE" dirty="0" smtClean="0"/>
-          </a:p>
-          <a:p>
-            <a:r>
-              <a:rPr lang="de-DE" dirty="0" smtClean="0"/>
+            <a:endParaRPr lang="de-DE" dirty="0"/>
+          </a:p>
+          <a:p>
+            <a:r>
+              <a:rPr lang="de-DE" dirty="0"/>
               <a:t>Abfrage: morgens, mittags, abends mit Kategorien Essen, Sehenswürdigkeiten, etc.</a:t>
             </a:r>
           </a:p>
           <a:p>
             <a:r>
-              <a:rPr lang="de-DE" dirty="0" smtClean="0"/>
+              <a:rPr lang="de-DE" dirty="0"/>
               <a:t>Rechts anzeige: </a:t>
             </a:r>
             <a:r>
-              <a:rPr lang="de-DE" dirty="0" err="1" smtClean="0"/>
+              <a:rPr lang="de-DE" dirty="0" err="1"/>
               <a:t>tagesempfehlung</a:t>
             </a:r>
             <a:endParaRPr lang="de-DE" dirty="0"/>
@@ -6367,7 +6438,7 @@
             <a:pPr marL="0" indent="0">
               <a:buNone/>
             </a:pPr>
-            <a:endParaRPr lang="de-DE" dirty="0" smtClean="0"/>
+            <a:endParaRPr lang="de-DE" dirty="0"/>
           </a:p>
         </p:txBody>
       </p:sp>
@@ -6417,10 +6488,9 @@
           <a:lstStyle/>
           <a:p>
             <a:r>
-              <a:rPr lang="de-DE" dirty="0" smtClean="0"/>
+              <a:rPr lang="de-DE" dirty="0"/>
               <a:t>Tools</a:t>
             </a:r>
-            <a:endParaRPr lang="de-DE" dirty="0"/>
           </a:p>
         </p:txBody>
       </p:sp>
@@ -6445,24 +6515,24 @@
           <a:lstStyle/>
           <a:p>
             <a:r>
-              <a:rPr lang="de-DE" dirty="0" smtClean="0"/>
+              <a:rPr lang="de-DE" dirty="0"/>
               <a:t>Atom</a:t>
             </a:r>
           </a:p>
           <a:p>
             <a:r>
-              <a:rPr lang="de-DE" dirty="0" err="1" smtClean="0"/>
+              <a:rPr lang="de-DE" dirty="0" err="1"/>
               <a:t>Github</a:t>
             </a:r>
-            <a:endParaRPr lang="de-DE" dirty="0" smtClean="0"/>
-          </a:p>
-          <a:p>
-            <a:r>
-              <a:rPr lang="de-DE" dirty="0" smtClean="0"/>
+            <a:endParaRPr lang="de-DE" dirty="0"/>
+          </a:p>
+          <a:p>
+            <a:r>
+              <a:rPr lang="de-DE" dirty="0"/>
               <a:t>Google </a:t>
             </a:r>
             <a:r>
-              <a:rPr lang="de-DE" dirty="0" err="1" smtClean="0"/>
+              <a:rPr lang="de-DE" dirty="0" err="1"/>
               <a:t>firebase</a:t>
             </a:r>
             <a:endParaRPr lang="de-DE" dirty="0"/>

</xml_diff>